<commit_message>
Sformułowanie problemu(drewniane można spolszczyć)
</commit_message>
<xml_diff>
--- a/Lab11_DESKA_DO PRASOWANIA/AP_L11_20190522_0800_G01.pptx
+++ b/Lab11_DESKA_DO PRASOWANIA/AP_L11_20190522_0800_G01.pptx
@@ -7136,6 +7136,199 @@
           </a:p>
         </p:txBody>
       </p:sp>
+      <p:sp>
+        <p:nvSpPr>
+          <p:cNvPr id="2" name="pole tekstowe 1">
+            <a:extLst>
+              <a:ext uri="{FF2B5EF4-FFF2-40B4-BE49-F238E27FC236}">
+                <a16:creationId xmlns:a16="http://schemas.microsoft.com/office/drawing/2014/main" id="{461A400D-EB36-4F7B-A5E4-8A28820444DB}"/>
+              </a:ext>
+            </a:extLst>
+          </p:cNvPr>
+          <p:cNvSpPr txBox="1"/>
+          <p:nvPr/>
+        </p:nvSpPr>
+        <p:spPr>
+          <a:xfrm>
+            <a:off x="271849" y="897578"/>
+            <a:ext cx="4436076" cy="923330"/>
+          </a:xfrm>
+          <a:prstGeom prst="rect">
+            <a:avLst/>
+          </a:prstGeom>
+          <a:noFill/>
+        </p:spPr>
+        <p:txBody>
+          <a:bodyPr wrap="square" rtlCol="0">
+            <a:spAutoFit/>
+          </a:bodyPr>
+          <a:lstStyle/>
+          <a:p>
+            <a:r>
+              <a:rPr lang="pl-PL" dirty="0"/>
+              <a:t>Celem ćwiczenia było opracowanie aplikacji sterującej tablicą wskaźników wysyłając odpowiednie wiadomości na sieć CAN</a:t>
+            </a:r>
+          </a:p>
+        </p:txBody>
+      </p:sp>
+      <p:sp>
+        <p:nvSpPr>
+          <p:cNvPr id="3" name="pole tekstowe 2">
+            <a:extLst>
+              <a:ext uri="{FF2B5EF4-FFF2-40B4-BE49-F238E27FC236}">
+                <a16:creationId xmlns:a16="http://schemas.microsoft.com/office/drawing/2014/main" id="{1E5F5E1E-C48D-4512-BB25-B87E6489156F}"/>
+              </a:ext>
+            </a:extLst>
+          </p:cNvPr>
+          <p:cNvSpPr txBox="1"/>
+          <p:nvPr/>
+        </p:nvSpPr>
+        <p:spPr>
+          <a:xfrm>
+            <a:off x="4707925" y="1668162"/>
+            <a:ext cx="3818237" cy="1477328"/>
+          </a:xfrm>
+          <a:prstGeom prst="rect">
+            <a:avLst/>
+          </a:prstGeom>
+          <a:noFill/>
+        </p:spPr>
+        <p:txBody>
+          <a:bodyPr wrap="square" rtlCol="0">
+            <a:spAutoFit/>
+          </a:bodyPr>
+          <a:lstStyle/>
+          <a:p>
+            <a:r>
+              <a:rPr lang="pl-PL" dirty="0"/>
+              <a:t>Aplikacja mogła zostać zbudowana na dwa sposoby: za pomocą oprogramowanie firmy VECTOR lub za pomocą MATLABA/</a:t>
+            </a:r>
+            <a:r>
+              <a:rPr lang="pl-PL" dirty="0" err="1"/>
+              <a:t>Simulinka</a:t>
+            </a:r>
+            <a:r>
+              <a:rPr lang="pl-PL" dirty="0"/>
+              <a:t> z </a:t>
+            </a:r>
+            <a:r>
+              <a:rPr lang="pl-PL" dirty="0" err="1"/>
+              <a:t>Vehicle</a:t>
+            </a:r>
+            <a:r>
+              <a:rPr lang="pl-PL" dirty="0"/>
+              <a:t> Network </a:t>
+            </a:r>
+            <a:r>
+              <a:rPr lang="pl-PL" dirty="0" err="1"/>
+              <a:t>Toolbox</a:t>
+            </a:r>
+            <a:endParaRPr lang="pl-PL" dirty="0"/>
+          </a:p>
+        </p:txBody>
+      </p:sp>
+      <p:sp>
+        <p:nvSpPr>
+          <p:cNvPr id="4" name="pole tekstowe 3">
+            <a:extLst>
+              <a:ext uri="{FF2B5EF4-FFF2-40B4-BE49-F238E27FC236}">
+                <a16:creationId xmlns:a16="http://schemas.microsoft.com/office/drawing/2014/main" id="{02ED4A24-4133-40AB-A086-C73861BE43E0}"/>
+              </a:ext>
+            </a:extLst>
+          </p:cNvPr>
+          <p:cNvSpPr txBox="1"/>
+          <p:nvPr/>
+        </p:nvSpPr>
+        <p:spPr>
+          <a:xfrm>
+            <a:off x="457200" y="2829697"/>
+            <a:ext cx="3818237" cy="1754326"/>
+          </a:xfrm>
+          <a:prstGeom prst="rect">
+            <a:avLst/>
+          </a:prstGeom>
+          <a:noFill/>
+        </p:spPr>
+        <p:txBody>
+          <a:bodyPr wrap="square" rtlCol="0">
+            <a:spAutoFit/>
+          </a:bodyPr>
+          <a:lstStyle/>
+          <a:p>
+            <a:r>
+              <a:rPr lang="pl-PL" dirty="0"/>
+              <a:t>Wybraliśmy aplikację w </a:t>
+            </a:r>
+            <a:r>
+              <a:rPr lang="pl-PL" dirty="0" err="1"/>
+              <a:t>Simulinku</a:t>
+            </a:r>
+            <a:r>
+              <a:rPr lang="pl-PL" dirty="0"/>
+              <a:t>. Aby poprawnie zamodelować aplikację potrzebowaliśmy czterech rodzajów bloczków: CAN </a:t>
+            </a:r>
+            <a:r>
+              <a:rPr lang="pl-PL" dirty="0" err="1"/>
+              <a:t>Configuration</a:t>
+            </a:r>
+            <a:r>
+              <a:rPr lang="pl-PL" dirty="0"/>
+              <a:t>, CAN Pack, CAN </a:t>
+            </a:r>
+            <a:r>
+              <a:rPr lang="pl-PL" dirty="0" err="1"/>
+              <a:t>Transmit</a:t>
+            </a:r>
+            <a:r>
+              <a:rPr lang="pl-PL" dirty="0"/>
+              <a:t> oraz bloki z wartościami stałymi</a:t>
+            </a:r>
+          </a:p>
+        </p:txBody>
+      </p:sp>
+      <p:sp>
+        <p:nvSpPr>
+          <p:cNvPr id="5" name="pole tekstowe 4">
+            <a:extLst>
+              <a:ext uri="{FF2B5EF4-FFF2-40B4-BE49-F238E27FC236}">
+                <a16:creationId xmlns:a16="http://schemas.microsoft.com/office/drawing/2014/main" id="{1152E991-1707-48DB-93B2-C52974BE513D}"/>
+              </a:ext>
+            </a:extLst>
+          </p:cNvPr>
+          <p:cNvSpPr txBox="1"/>
+          <p:nvPr/>
+        </p:nvSpPr>
+        <p:spPr>
+          <a:xfrm>
+            <a:off x="4806778" y="3991232"/>
+            <a:ext cx="3502950" cy="1477328"/>
+          </a:xfrm>
+          <a:prstGeom prst="rect">
+            <a:avLst/>
+          </a:prstGeom>
+          <a:noFill/>
+        </p:spPr>
+        <p:txBody>
+          <a:bodyPr wrap="square" rtlCol="0">
+            <a:spAutoFit/>
+          </a:bodyPr>
+          <a:lstStyle/>
+          <a:p>
+            <a:r>
+              <a:rPr lang="pl-PL" dirty="0"/>
+              <a:t>Aby obserwować dynamiczne zmiany na wyświetlaczu użyliśmy także bloczku </a:t>
+            </a:r>
+            <a:r>
+              <a:rPr lang="pl-PL" dirty="0" err="1"/>
+              <a:t>Waveform</a:t>
+            </a:r>
+            <a:r>
+              <a:rPr lang="pl-PL" dirty="0"/>
+              <a:t> w którym zaimplementowaliśmy funkcje o wartościach zmiennych w czasie</a:t>
+            </a:r>
+          </a:p>
+        </p:txBody>
+      </p:sp>
     </p:spTree>
   </p:cSld>
   <p:clrMapOvr>
@@ -7490,11 +7683,41 @@
           <a:p>
             <a:r>
               <a:rPr lang="pl-PL" sz="1200" dirty="0"/>
-              <a:t>Wykorzystując pakiet SIMULIK zamodelowano układ równań oraz napisano skrypt symulujący różne rodzaje podłoża:</a:t>
-            </a:r>
-          </a:p>
-        </p:txBody>
-      </p:sp>
+              <a:t>Wykorzystując pakiet SIMULIK zamodelowano aplikację do sterowania tablicą wskaźników</a:t>
+            </a:r>
+          </a:p>
+        </p:txBody>
+      </p:sp>
+      <p:pic>
+        <p:nvPicPr>
+          <p:cNvPr id="4" name="Obraz 3" descr="Obraz zawierający tekst&#10;&#10;Opis wygenerowany automatycznie">
+            <a:extLst>
+              <a:ext uri="{FF2B5EF4-FFF2-40B4-BE49-F238E27FC236}">
+                <a16:creationId xmlns:a16="http://schemas.microsoft.com/office/drawing/2014/main" id="{B71607E5-C73F-4252-B61F-19E761B53899}"/>
+              </a:ext>
+            </a:extLst>
+          </p:cNvPr>
+          <p:cNvPicPr>
+            <a:picLocks noChangeAspect="1"/>
+          </p:cNvPicPr>
+          <p:nvPr/>
+        </p:nvPicPr>
+        <p:blipFill>
+          <a:blip r:embed="rId3"/>
+          <a:stretch>
+            <a:fillRect/>
+          </a:stretch>
+        </p:blipFill>
+        <p:spPr>
+          <a:xfrm>
+            <a:off x="45543" y="841979"/>
+            <a:ext cx="9144000" cy="5514371"/>
+          </a:xfrm>
+          <a:prstGeom prst="rect">
+            <a:avLst/>
+          </a:prstGeom>
+        </p:spPr>
+      </p:pic>
     </p:spTree>
   </p:cSld>
   <p:clrMapOvr>

</xml_diff>